<commit_message>
fejléc kép, tartalom beállítás
</commit_message>
<xml_diff>
--- a/Beadandó SK.pptx
+++ b/Beadandó SK.pptx
@@ -11,8 +11,8 @@
     <p:sldId id="259" r:id="rId5"/>
     <p:sldId id="260" r:id="rId6"/>
     <p:sldId id="261" r:id="rId7"/>
-    <p:sldId id="262" r:id="rId8"/>
-    <p:sldId id="263" r:id="rId9"/>
+    <p:sldId id="263" r:id="rId8"/>
+    <p:sldId id="262" r:id="rId9"/>
     <p:sldId id="264" r:id="rId10"/>
     <p:sldId id="265" r:id="rId11"/>
   </p:sldIdLst>
@@ -113,6 +113,11 @@
       </a:defRPr>
     </a:lvl9pPr>
   </p:defaultTextStyle>
+  <p:extLst>
+    <p:ext uri="{EFAFB233-063F-42B5-8137-9DF3F51BA10A}">
+      <p15:sldGuideLst xmlns:p15="http://schemas.microsoft.com/office/powerpoint/2012/main"/>
+    </p:ext>
+  </p:extLst>
 </p:presentation>
 </file>
 
@@ -247,7 +252,7 @@
           <a:p>
             <a:fld id="{BD5193CC-C62B-423D-A098-867CDE0A1E84}" type="datetimeFigureOut">
               <a:rPr lang="hu-HU" smtClean="0"/>
-              <a:t>2022.09.08.</a:t>
+              <a:t>2022.09.12.</a:t>
             </a:fld>
             <a:endParaRPr lang="hu-HU"/>
           </a:p>
@@ -417,7 +422,7 @@
           <a:p>
             <a:fld id="{BD5193CC-C62B-423D-A098-867CDE0A1E84}" type="datetimeFigureOut">
               <a:rPr lang="hu-HU" smtClean="0"/>
-              <a:t>2022.09.08.</a:t>
+              <a:t>2022.09.12.</a:t>
             </a:fld>
             <a:endParaRPr lang="hu-HU"/>
           </a:p>
@@ -597,7 +602,7 @@
           <a:p>
             <a:fld id="{BD5193CC-C62B-423D-A098-867CDE0A1E84}" type="datetimeFigureOut">
               <a:rPr lang="hu-HU" smtClean="0"/>
-              <a:t>2022.09.08.</a:t>
+              <a:t>2022.09.12.</a:t>
             </a:fld>
             <a:endParaRPr lang="hu-HU"/>
           </a:p>
@@ -767,7 +772,7 @@
           <a:p>
             <a:fld id="{BD5193CC-C62B-423D-A098-867CDE0A1E84}" type="datetimeFigureOut">
               <a:rPr lang="hu-HU" smtClean="0"/>
-              <a:t>2022.09.08.</a:t>
+              <a:t>2022.09.12.</a:t>
             </a:fld>
             <a:endParaRPr lang="hu-HU"/>
           </a:p>
@@ -1013,7 +1018,7 @@
           <a:p>
             <a:fld id="{BD5193CC-C62B-423D-A098-867CDE0A1E84}" type="datetimeFigureOut">
               <a:rPr lang="hu-HU" smtClean="0"/>
-              <a:t>2022.09.08.</a:t>
+              <a:t>2022.09.12.</a:t>
             </a:fld>
             <a:endParaRPr lang="hu-HU"/>
           </a:p>
@@ -1245,7 +1250,7 @@
           <a:p>
             <a:fld id="{BD5193CC-C62B-423D-A098-867CDE0A1E84}" type="datetimeFigureOut">
               <a:rPr lang="hu-HU" smtClean="0"/>
-              <a:t>2022.09.08.</a:t>
+              <a:t>2022.09.12.</a:t>
             </a:fld>
             <a:endParaRPr lang="hu-HU"/>
           </a:p>
@@ -1612,7 +1617,7 @@
           <a:p>
             <a:fld id="{BD5193CC-C62B-423D-A098-867CDE0A1E84}" type="datetimeFigureOut">
               <a:rPr lang="hu-HU" smtClean="0"/>
-              <a:t>2022.09.08.</a:t>
+              <a:t>2022.09.12.</a:t>
             </a:fld>
             <a:endParaRPr lang="hu-HU"/>
           </a:p>
@@ -1730,7 +1735,7 @@
           <a:p>
             <a:fld id="{BD5193CC-C62B-423D-A098-867CDE0A1E84}" type="datetimeFigureOut">
               <a:rPr lang="hu-HU" smtClean="0"/>
-              <a:t>2022.09.08.</a:t>
+              <a:t>2022.09.12.</a:t>
             </a:fld>
             <a:endParaRPr lang="hu-HU"/>
           </a:p>
@@ -1825,7 +1830,7 @@
           <a:p>
             <a:fld id="{BD5193CC-C62B-423D-A098-867CDE0A1E84}" type="datetimeFigureOut">
               <a:rPr lang="hu-HU" smtClean="0"/>
-              <a:t>2022.09.08.</a:t>
+              <a:t>2022.09.12.</a:t>
             </a:fld>
             <a:endParaRPr lang="hu-HU"/>
           </a:p>
@@ -2102,7 +2107,7 @@
           <a:p>
             <a:fld id="{BD5193CC-C62B-423D-A098-867CDE0A1E84}" type="datetimeFigureOut">
               <a:rPr lang="hu-HU" smtClean="0"/>
-              <a:t>2022.09.08.</a:t>
+              <a:t>2022.09.12.</a:t>
             </a:fld>
             <a:endParaRPr lang="hu-HU"/>
           </a:p>
@@ -2355,7 +2360,7 @@
           <a:p>
             <a:fld id="{BD5193CC-C62B-423D-A098-867CDE0A1E84}" type="datetimeFigureOut">
               <a:rPr lang="hu-HU" smtClean="0"/>
-              <a:t>2022.09.08.</a:t>
+              <a:t>2022.09.12.</a:t>
             </a:fld>
             <a:endParaRPr lang="hu-HU"/>
           </a:p>
@@ -2568,7 +2573,7 @@
           <a:p>
             <a:fld id="{BD5193CC-C62B-423D-A098-867CDE0A1E84}" type="datetimeFigureOut">
               <a:rPr lang="hu-HU" smtClean="0"/>
-              <a:t>2022.09.08.</a:t>
+              <a:t>2022.09.12.</a:t>
             </a:fld>
             <a:endParaRPr lang="hu-HU"/>
           </a:p>
@@ -2997,12 +3002,16 @@
           <a:p>
             <a:r>
               <a:rPr lang="hu-HU" dirty="0" smtClean="0">
-                <a:latin typeface="Century Schoolbook" panose="02040604050505020304" pitchFamily="18" charset="0"/>
+                <a:latin typeface="Arial Unicode MS" panose="020B0604020202020204" pitchFamily="34" charset="-128"/>
+                <a:ea typeface="Arial Unicode MS" panose="020B0604020202020204" pitchFamily="34" charset="-128"/>
+                <a:cs typeface="Arial Unicode MS" panose="020B0604020202020204" pitchFamily="34" charset="-128"/>
               </a:rPr>
               <a:t>Számítógépes vírusok</a:t>
             </a:r>
             <a:endParaRPr lang="hu-HU" dirty="0">
-              <a:latin typeface="Century Schoolbook" panose="02040604050505020304" pitchFamily="18" charset="0"/>
+              <a:latin typeface="Arial Unicode MS" panose="020B0604020202020204" pitchFamily="34" charset="-128"/>
+              <a:ea typeface="Arial Unicode MS" panose="020B0604020202020204" pitchFamily="34" charset="-128"/>
+              <a:cs typeface="Arial Unicode MS" panose="020B0604020202020204" pitchFamily="34" charset="-128"/>
             </a:endParaRPr>
           </a:p>
         </p:txBody>
@@ -3020,7 +3029,7 @@
         <p:spPr>
           <a:xfrm>
             <a:off x="3613150" y="3517900"/>
-            <a:ext cx="4775200" cy="939800"/>
+            <a:ext cx="4775200" cy="559830"/>
           </a:xfrm>
         </p:spPr>
         <p:txBody>
@@ -3031,12 +3040,16 @@
           <a:p>
             <a:r>
               <a:rPr lang="hu-HU" sz="2800" dirty="0" smtClean="0">
-                <a:latin typeface="Century Schoolbook" panose="02040604050505020304" pitchFamily="18" charset="0"/>
+                <a:latin typeface="Arial Unicode MS" panose="020B0604020202020204" pitchFamily="34" charset="-128"/>
+                <a:ea typeface="Arial Unicode MS" panose="020B0604020202020204" pitchFamily="34" charset="-128"/>
+                <a:cs typeface="Arial Unicode MS" panose="020B0604020202020204" pitchFamily="34" charset="-128"/>
               </a:rPr>
               <a:t>Készítette: Somodi Konrád</a:t>
             </a:r>
             <a:endParaRPr lang="hu-HU" sz="2800" dirty="0">
-              <a:latin typeface="Century Schoolbook" panose="02040604050505020304" pitchFamily="18" charset="0"/>
+              <a:latin typeface="Arial Unicode MS" panose="020B0604020202020204" pitchFamily="34" charset="-128"/>
+              <a:ea typeface="Arial Unicode MS" panose="020B0604020202020204" pitchFamily="34" charset="-128"/>
+              <a:cs typeface="Arial Unicode MS" panose="020B0604020202020204" pitchFamily="34" charset="-128"/>
             </a:endParaRPr>
           </a:p>
         </p:txBody>
@@ -3051,6 +3064,13 @@
   <p:clrMapOvr>
     <a:masterClrMapping/>
   </p:clrMapOvr>
+  <p:timing>
+    <p:tnLst>
+      <p:par>
+        <p:cTn id="1" dur="indefinite" restart="never" nodeType="tmRoot"/>
+      </p:par>
+    </p:tnLst>
+  </p:timing>
 </p:sld>
 </file>
 
@@ -3145,12 +3165,32 @@
             <p:ph type="title"/>
           </p:nvPr>
         </p:nvSpPr>
-        <p:spPr/>
-        <p:txBody>
-          <a:bodyPr/>
-          <a:lstStyle/>
-          <a:p>
-            <a:endParaRPr lang="hu-HU"/>
+        <p:spPr>
+          <a:xfrm>
+            <a:off x="220362" y="276911"/>
+            <a:ext cx="3041822" cy="676275"/>
+          </a:xfrm>
+        </p:spPr>
+        <p:txBody>
+          <a:bodyPr>
+            <a:normAutofit fontScale="90000"/>
+          </a:bodyPr>
+          <a:lstStyle/>
+          <a:p>
+            <a:pPr algn="ctr"/>
+            <a:r>
+              <a:rPr lang="hu-HU" dirty="0" smtClean="0">
+                <a:latin typeface="Arial Unicode MS" panose="020B0604020202020204" pitchFamily="34" charset="-128"/>
+                <a:ea typeface="Arial Unicode MS" panose="020B0604020202020204" pitchFamily="34" charset="-128"/>
+                <a:cs typeface="Arial Unicode MS" panose="020B0604020202020204" pitchFamily="34" charset="-128"/>
+              </a:rPr>
+              <a:t>Mi a vírus?</a:t>
+            </a:r>
+            <a:endParaRPr lang="hu-HU" dirty="0">
+              <a:latin typeface="Arial Unicode MS" panose="020B0604020202020204" pitchFamily="34" charset="-128"/>
+              <a:ea typeface="Arial Unicode MS" panose="020B0604020202020204" pitchFamily="34" charset="-128"/>
+              <a:cs typeface="Arial Unicode MS" panose="020B0604020202020204" pitchFamily="34" charset="-128"/>
+            </a:endParaRPr>
           </a:p>
         </p:txBody>
       </p:sp>
@@ -3164,15 +3204,158 @@
             <p:ph idx="1"/>
           </p:nvPr>
         </p:nvSpPr>
-        <p:spPr/>
-        <p:txBody>
-          <a:bodyPr/>
-          <a:lstStyle/>
-          <a:p>
-            <a:endParaRPr lang="hu-HU"/>
-          </a:p>
-        </p:txBody>
-      </p:sp>
+        <p:spPr>
+          <a:xfrm>
+            <a:off x="220362" y="1126182"/>
+            <a:ext cx="11432060" cy="5422900"/>
+          </a:xfrm>
+        </p:spPr>
+        <p:txBody>
+          <a:bodyPr>
+            <a:noAutofit/>
+          </a:bodyPr>
+          <a:lstStyle/>
+          <a:p>
+            <a:pPr algn="just"/>
+            <a:r>
+              <a:rPr lang="hu-HU" dirty="0" smtClean="0">
+                <a:latin typeface="Arial Unicode MS" panose="020B0604020202020204" pitchFamily="34" charset="-128"/>
+                <a:ea typeface="Arial Unicode MS" panose="020B0604020202020204" pitchFamily="34" charset="-128"/>
+                <a:cs typeface="Arial Unicode MS" panose="020B0604020202020204" pitchFamily="34" charset="-128"/>
+              </a:rPr>
+              <a:t>Olyan programkód, </a:t>
+            </a:r>
+            <a:r>
+              <a:rPr lang="hu-HU" dirty="0">
+                <a:latin typeface="Arial Unicode MS" panose="020B0604020202020204" pitchFamily="34" charset="-128"/>
+                <a:ea typeface="Arial Unicode MS" panose="020B0604020202020204" pitchFamily="34" charset="-128"/>
+                <a:cs typeface="Arial Unicode MS" panose="020B0604020202020204" pitchFamily="34" charset="-128"/>
+              </a:rPr>
+              <a:t>amely saját másolatait helyezi el </a:t>
+            </a:r>
+            <a:r>
+              <a:rPr lang="hu-HU" dirty="0" smtClean="0">
+                <a:latin typeface="Arial Unicode MS" panose="020B0604020202020204" pitchFamily="34" charset="-128"/>
+                <a:ea typeface="Arial Unicode MS" panose="020B0604020202020204" pitchFamily="34" charset="-128"/>
+                <a:cs typeface="Arial Unicode MS" panose="020B0604020202020204" pitchFamily="34" charset="-128"/>
+              </a:rPr>
+              <a:t>programokban </a:t>
+            </a:r>
+            <a:r>
+              <a:rPr lang="hu-HU" dirty="0">
+                <a:latin typeface="Arial Unicode MS" panose="020B0604020202020204" pitchFamily="34" charset="-128"/>
+                <a:ea typeface="Arial Unicode MS" panose="020B0604020202020204" pitchFamily="34" charset="-128"/>
+                <a:cs typeface="Arial Unicode MS" panose="020B0604020202020204" pitchFamily="34" charset="-128"/>
+              </a:rPr>
+              <a:t>vagy </a:t>
+            </a:r>
+            <a:r>
+              <a:rPr lang="hu-HU" dirty="0" smtClean="0">
+                <a:latin typeface="Arial Unicode MS" panose="020B0604020202020204" pitchFamily="34" charset="-128"/>
+                <a:ea typeface="Arial Unicode MS" panose="020B0604020202020204" pitchFamily="34" charset="-128"/>
+                <a:cs typeface="Arial Unicode MS" panose="020B0604020202020204" pitchFamily="34" charset="-128"/>
+              </a:rPr>
+              <a:t>dokumentumokban. </a:t>
+            </a:r>
+          </a:p>
+          <a:p>
+            <a:pPr algn="just"/>
+            <a:r>
+              <a:rPr lang="hu-HU" dirty="0" smtClean="0">
+                <a:latin typeface="Arial Unicode MS" panose="020B0604020202020204" pitchFamily="34" charset="-128"/>
+                <a:ea typeface="Arial Unicode MS" panose="020B0604020202020204" pitchFamily="34" charset="-128"/>
+                <a:cs typeface="Arial Unicode MS" panose="020B0604020202020204" pitchFamily="34" charset="-128"/>
+              </a:rPr>
+              <a:t>Vírus jellemzően</a:t>
+            </a:r>
+          </a:p>
+          <a:p>
+            <a:pPr marL="971550" lvl="1" indent="-514350" algn="just">
+              <a:buFont typeface="+mj-lt"/>
+              <a:buAutoNum type="arabicPeriod"/>
+            </a:pPr>
+            <a:r>
+              <a:rPr lang="hu-HU" sz="2800" dirty="0" smtClean="0">
+                <a:latin typeface="Arial Unicode MS" panose="020B0604020202020204" pitchFamily="34" charset="-128"/>
+                <a:ea typeface="Arial Unicode MS" panose="020B0604020202020204" pitchFamily="34" charset="-128"/>
+                <a:cs typeface="Arial Unicode MS" panose="020B0604020202020204" pitchFamily="34" charset="-128"/>
+              </a:rPr>
+              <a:t>Pendrive</a:t>
+            </a:r>
+          </a:p>
+          <a:p>
+            <a:pPr marL="971550" lvl="1" indent="-514350" algn="just">
+              <a:buFont typeface="+mj-lt"/>
+              <a:buAutoNum type="arabicPeriod"/>
+            </a:pPr>
+            <a:r>
+              <a:rPr lang="hu-HU" sz="2800" dirty="0" smtClean="0">
+                <a:latin typeface="Arial Unicode MS" panose="020B0604020202020204" pitchFamily="34" charset="-128"/>
+                <a:ea typeface="Arial Unicode MS" panose="020B0604020202020204" pitchFamily="34" charset="-128"/>
+                <a:cs typeface="Arial Unicode MS" panose="020B0604020202020204" pitchFamily="34" charset="-128"/>
+              </a:rPr>
+              <a:t>Email</a:t>
+            </a:r>
+          </a:p>
+          <a:p>
+            <a:pPr marL="971550" lvl="1" indent="-514350" algn="just">
+              <a:buFont typeface="+mj-lt"/>
+              <a:buAutoNum type="arabicPeriod"/>
+            </a:pPr>
+            <a:r>
+              <a:rPr lang="hu-HU" sz="2800" dirty="0" smtClean="0">
+                <a:latin typeface="Arial Unicode MS" panose="020B0604020202020204" pitchFamily="34" charset="-128"/>
+                <a:ea typeface="Arial Unicode MS" panose="020B0604020202020204" pitchFamily="34" charset="-128"/>
+                <a:cs typeface="Arial Unicode MS" panose="020B0604020202020204" pitchFamily="34" charset="-128"/>
+              </a:rPr>
+              <a:t>Internetes letöltések</a:t>
+            </a:r>
+          </a:p>
+        </p:txBody>
+      </p:sp>
+      <p:pic>
+        <p:nvPicPr>
+          <p:cNvPr id="4" name="Kép 3"/>
+          <p:cNvPicPr>
+            <a:picLocks noChangeAspect="1"/>
+          </p:cNvPicPr>
+          <p:nvPr/>
+        </p:nvPicPr>
+        <p:blipFill>
+          <a:blip r:embed="rId2">
+            <a:extLst>
+              <a:ext uri="{28A0092B-C50C-407E-A947-70E740481C1C}">
+                <a14:useLocalDpi xmlns:a14="http://schemas.microsoft.com/office/drawing/2010/main" val="0"/>
+              </a:ext>
+            </a:extLst>
+          </a:blip>
+          <a:stretch>
+            <a:fillRect/>
+          </a:stretch>
+        </p:blipFill>
+        <p:spPr>
+          <a:xfrm>
+            <a:off x="4856204" y="1921304"/>
+            <a:ext cx="6796218" cy="4264642"/>
+          </a:xfrm>
+          <a:prstGeom prst="roundRect">
+            <a:avLst>
+              <a:gd name="adj" fmla="val 8594"/>
+            </a:avLst>
+          </a:prstGeom>
+          <a:solidFill>
+            <a:srgbClr val="FFFFFF">
+              <a:shade val="85000"/>
+            </a:srgbClr>
+          </a:solidFill>
+          <a:ln>
+            <a:noFill/>
+          </a:ln>
+          <a:effectLst>
+            <a:reflection blurRad="12700" stA="38000" endPos="28000" dist="5000" dir="5400000" sy="-100000" algn="bl" rotWithShape="0"/>
+          </a:effectLst>
+        </p:spPr>
+      </p:pic>
     </p:spTree>
     <p:extLst>
       <p:ext uri="{BB962C8B-B14F-4D97-AF65-F5344CB8AC3E}">
@@ -3183,6 +3366,13 @@
   <p:clrMapOvr>
     <a:masterClrMapping/>
   </p:clrMapOvr>
+  <p:timing>
+    <p:tnLst>
+      <p:par>
+        <p:cTn id="1" dur="indefinite" restart="never" nodeType="tmRoot"/>
+      </p:par>
+    </p:tnLst>
+  </p:timing>
 </p:sld>
 </file>
 
@@ -3213,12 +3403,21 @@
             <p:ph type="title"/>
           </p:nvPr>
         </p:nvSpPr>
-        <p:spPr/>
-        <p:txBody>
-          <a:bodyPr/>
-          <a:lstStyle/>
-          <a:p>
-            <a:endParaRPr lang="hu-HU"/>
+        <p:spPr>
+          <a:xfrm>
+            <a:off x="838200" y="631825"/>
+            <a:ext cx="4368800" cy="968375"/>
+          </a:xfrm>
+        </p:spPr>
+        <p:txBody>
+          <a:bodyPr/>
+          <a:lstStyle/>
+          <a:p>
+            <a:r>
+              <a:rPr lang="hu-HU" dirty="0" smtClean="0"/>
+              <a:t>Vírusok működése</a:t>
+            </a:r>
+            <a:endParaRPr lang="hu-HU" dirty="0"/>
           </a:p>
         </p:txBody>
       </p:sp>
@@ -3237,7 +3436,7 @@
           <a:bodyPr/>
           <a:lstStyle/>
           <a:p>
-            <a:endParaRPr lang="hu-HU"/>
+            <a:endParaRPr lang="hu-HU" dirty="0"/>
           </a:p>
         </p:txBody>
       </p:sp>
@@ -3281,12 +3480,27 @@
             <p:ph type="title"/>
           </p:nvPr>
         </p:nvSpPr>
-        <p:spPr/>
-        <p:txBody>
-          <a:bodyPr/>
-          <a:lstStyle/>
-          <a:p>
-            <a:endParaRPr lang="hu-HU"/>
+        <p:spPr>
+          <a:xfrm>
+            <a:off x="838200" y="1028700"/>
+            <a:ext cx="2732903" cy="661988"/>
+          </a:xfrm>
+        </p:spPr>
+        <p:txBody>
+          <a:bodyPr>
+            <a:normAutofit/>
+          </a:bodyPr>
+          <a:lstStyle/>
+          <a:p>
+            <a:r>
+              <a:rPr lang="hu-HU" sz="4000" dirty="0" smtClean="0">
+                <a:latin typeface="Century Schoolbook" panose="02040604050505020304" pitchFamily="18" charset="0"/>
+              </a:rPr>
+              <a:t>Jellemzőik</a:t>
+            </a:r>
+            <a:endParaRPr lang="hu-HU" sz="4000" dirty="0">
+              <a:latin typeface="Century Schoolbook" panose="02040604050505020304" pitchFamily="18" charset="0"/>
+            </a:endParaRPr>
           </a:p>
         </p:txBody>
       </p:sp>
@@ -3300,12 +3514,128 @@
             <p:ph idx="1"/>
           </p:nvPr>
         </p:nvSpPr>
-        <p:spPr/>
-        <p:txBody>
-          <a:bodyPr/>
-          <a:lstStyle/>
-          <a:p>
-            <a:endParaRPr lang="hu-HU"/>
+        <p:spPr>
+          <a:xfrm>
+            <a:off x="838200" y="2121414"/>
+            <a:ext cx="10515600" cy="3686262"/>
+          </a:xfrm>
+        </p:spPr>
+        <p:txBody>
+          <a:bodyPr>
+            <a:noAutofit/>
+          </a:bodyPr>
+          <a:lstStyle/>
+          <a:p>
+            <a:r>
+              <a:rPr lang="hu-HU" dirty="0">
+                <a:latin typeface="Arial Unicode MS" panose="020B0604020202020204" pitchFamily="34" charset="-128"/>
+                <a:ea typeface="Arial Unicode MS" panose="020B0604020202020204" pitchFamily="34" charset="-128"/>
+                <a:cs typeface="Arial Unicode MS" panose="020B0604020202020204" pitchFamily="34" charset="-128"/>
+              </a:rPr>
+              <a:t>A gazdaprogramok </a:t>
+            </a:r>
+            <a:r>
+              <a:rPr lang="hu-HU" dirty="0" smtClean="0">
+                <a:latin typeface="Arial Unicode MS" panose="020B0604020202020204" pitchFamily="34" charset="-128"/>
+                <a:ea typeface="Arial Unicode MS" panose="020B0604020202020204" pitchFamily="34" charset="-128"/>
+                <a:cs typeface="Arial Unicode MS" panose="020B0604020202020204" pitchFamily="34" charset="-128"/>
+              </a:rPr>
+              <a:t>megfertőzése, </a:t>
+            </a:r>
+            <a:r>
+              <a:rPr lang="hu-HU" dirty="0">
+                <a:latin typeface="Arial Unicode MS" panose="020B0604020202020204" pitchFamily="34" charset="-128"/>
+                <a:ea typeface="Arial Unicode MS" panose="020B0604020202020204" pitchFamily="34" charset="-128"/>
+                <a:cs typeface="Arial Unicode MS" panose="020B0604020202020204" pitchFamily="34" charset="-128"/>
+              </a:rPr>
+              <a:t>önsokszorosító viselkedés valamennyi vírusra </a:t>
+            </a:r>
+            <a:r>
+              <a:rPr lang="hu-HU" dirty="0" smtClean="0">
+                <a:latin typeface="Arial Unicode MS" panose="020B0604020202020204" pitchFamily="34" charset="-128"/>
+                <a:ea typeface="Arial Unicode MS" panose="020B0604020202020204" pitchFamily="34" charset="-128"/>
+                <a:cs typeface="Arial Unicode MS" panose="020B0604020202020204" pitchFamily="34" charset="-128"/>
+              </a:rPr>
+              <a:t>jellemző, továbbá:</a:t>
+            </a:r>
+          </a:p>
+          <a:p>
+            <a:pPr marL="971550" lvl="1" indent="-514350">
+              <a:lnSpc>
+                <a:spcPct val="150000"/>
+              </a:lnSpc>
+              <a:buFont typeface="+mj-lt"/>
+              <a:buAutoNum type="arabicPeriod"/>
+            </a:pPr>
+            <a:r>
+              <a:rPr lang="hu-HU" sz="2800" dirty="0">
+                <a:latin typeface="Arial Unicode MS" panose="020B0604020202020204" pitchFamily="34" charset="-128"/>
+                <a:ea typeface="Arial Unicode MS" panose="020B0604020202020204" pitchFamily="34" charset="-128"/>
+                <a:cs typeface="Arial Unicode MS" panose="020B0604020202020204" pitchFamily="34" charset="-128"/>
+              </a:rPr>
+              <a:t>nagyon kis </a:t>
+            </a:r>
+            <a:r>
+              <a:rPr lang="hu-HU" sz="2800" dirty="0" smtClean="0">
+                <a:latin typeface="Arial Unicode MS" panose="020B0604020202020204" pitchFamily="34" charset="-128"/>
+                <a:ea typeface="Arial Unicode MS" panose="020B0604020202020204" pitchFamily="34" charset="-128"/>
+                <a:cs typeface="Arial Unicode MS" panose="020B0604020202020204" pitchFamily="34" charset="-128"/>
+              </a:rPr>
+              <a:t>méretűek</a:t>
+            </a:r>
+          </a:p>
+          <a:p>
+            <a:pPr marL="971550" lvl="1" indent="-514350">
+              <a:lnSpc>
+                <a:spcPct val="150000"/>
+              </a:lnSpc>
+              <a:buFont typeface="+mj-lt"/>
+              <a:buAutoNum type="arabicPeriod"/>
+            </a:pPr>
+            <a:r>
+              <a:rPr lang="hu-HU" sz="2800" dirty="0">
+                <a:latin typeface="Arial Unicode MS" panose="020B0604020202020204" pitchFamily="34" charset="-128"/>
+                <a:ea typeface="Arial Unicode MS" panose="020B0604020202020204" pitchFamily="34" charset="-128"/>
+                <a:cs typeface="Arial Unicode MS" panose="020B0604020202020204" pitchFamily="34" charset="-128"/>
+              </a:rPr>
+              <a:t>futtatható állományokat képesek </a:t>
+            </a:r>
+            <a:r>
+              <a:rPr lang="hu-HU" sz="2800" dirty="0" smtClean="0">
+                <a:latin typeface="Arial Unicode MS" panose="020B0604020202020204" pitchFamily="34" charset="-128"/>
+                <a:ea typeface="Arial Unicode MS" panose="020B0604020202020204" pitchFamily="34" charset="-128"/>
+                <a:cs typeface="Arial Unicode MS" panose="020B0604020202020204" pitchFamily="34" charset="-128"/>
+              </a:rPr>
+              <a:t>megfertőzni</a:t>
+            </a:r>
+          </a:p>
+          <a:p>
+            <a:pPr marL="971550" lvl="1" indent="-514350">
+              <a:lnSpc>
+                <a:spcPct val="150000"/>
+              </a:lnSpc>
+              <a:buFont typeface="+mj-lt"/>
+              <a:buAutoNum type="arabicPeriod"/>
+            </a:pPr>
+            <a:r>
+              <a:rPr lang="hu-HU" sz="2800" dirty="0">
+                <a:latin typeface="Arial Unicode MS" panose="020B0604020202020204" pitchFamily="34" charset="-128"/>
+                <a:ea typeface="Arial Unicode MS" panose="020B0604020202020204" pitchFamily="34" charset="-128"/>
+                <a:cs typeface="Arial Unicode MS" panose="020B0604020202020204" pitchFamily="34" charset="-128"/>
+              </a:rPr>
+              <a:t>rejtetten </a:t>
+            </a:r>
+            <a:r>
+              <a:rPr lang="hu-HU" sz="2800" dirty="0" smtClean="0">
+                <a:latin typeface="Arial Unicode MS" panose="020B0604020202020204" pitchFamily="34" charset="-128"/>
+                <a:ea typeface="Arial Unicode MS" panose="020B0604020202020204" pitchFamily="34" charset="-128"/>
+                <a:cs typeface="Arial Unicode MS" panose="020B0604020202020204" pitchFamily="34" charset="-128"/>
+              </a:rPr>
+              <a:t>működnek, akkor fedik fel magukat, hogyha feladatukat elvégezték</a:t>
+            </a:r>
+          </a:p>
+          <a:p>
+            <a:endParaRPr lang="hu-HU" dirty="0"/>
           </a:p>
         </p:txBody>
       </p:sp>
@@ -3349,12 +3679,23 @@
             <p:ph type="title"/>
           </p:nvPr>
         </p:nvSpPr>
-        <p:spPr/>
-        <p:txBody>
-          <a:bodyPr/>
-          <a:lstStyle/>
-          <a:p>
-            <a:endParaRPr lang="hu-HU"/>
+        <p:spPr>
+          <a:xfrm>
+            <a:off x="838200" y="947737"/>
+            <a:ext cx="4445000" cy="877888"/>
+          </a:xfrm>
+        </p:spPr>
+        <p:txBody>
+          <a:bodyPr>
+            <a:normAutofit fontScale="90000"/>
+          </a:bodyPr>
+          <a:lstStyle/>
+          <a:p>
+            <a:r>
+              <a:rPr lang="hu-HU" dirty="0" smtClean="0"/>
+              <a:t>Legismertebb fajtái</a:t>
+            </a:r>
+            <a:endParaRPr lang="hu-HU" dirty="0"/>
           </a:p>
         </p:txBody>
       </p:sp>
@@ -3368,12 +3709,17 @@
             <p:ph idx="1"/>
           </p:nvPr>
         </p:nvSpPr>
-        <p:spPr/>
-        <p:txBody>
-          <a:bodyPr/>
-          <a:lstStyle/>
-          <a:p>
-            <a:endParaRPr lang="hu-HU"/>
+        <p:spPr>
+          <a:xfrm>
+            <a:off x="838200" y="2028825"/>
+            <a:ext cx="10515600" cy="4351338"/>
+          </a:xfrm>
+        </p:spPr>
+        <p:txBody>
+          <a:bodyPr/>
+          <a:lstStyle/>
+          <a:p>
+            <a:endParaRPr lang="hu-HU" dirty="0"/>
           </a:p>
         </p:txBody>
       </p:sp>
@@ -3417,12 +3763,23 @@
             <p:ph type="title"/>
           </p:nvPr>
         </p:nvSpPr>
-        <p:spPr/>
-        <p:txBody>
-          <a:bodyPr/>
-          <a:lstStyle/>
-          <a:p>
-            <a:endParaRPr lang="hu-HU"/>
+        <p:spPr>
+          <a:xfrm>
+            <a:off x="838200" y="787400"/>
+            <a:ext cx="6794500" cy="649288"/>
+          </a:xfrm>
+        </p:spPr>
+        <p:txBody>
+          <a:bodyPr>
+            <a:normAutofit fontScale="90000"/>
+          </a:bodyPr>
+          <a:lstStyle/>
+          <a:p>
+            <a:r>
+              <a:rPr lang="hu-HU" dirty="0" smtClean="0"/>
+              <a:t>Milyen fenyegetések vannak?</a:t>
+            </a:r>
+            <a:endParaRPr lang="hu-HU" dirty="0"/>
           </a:p>
         </p:txBody>
       </p:sp>
@@ -3436,7 +3793,12 @@
             <p:ph idx="1"/>
           </p:nvPr>
         </p:nvSpPr>
-        <p:spPr/>
+        <p:spPr>
+          <a:xfrm>
+            <a:off x="838200" y="2079625"/>
+            <a:ext cx="10515600" cy="4351338"/>
+          </a:xfrm>
+        </p:spPr>
         <p:txBody>
           <a:bodyPr/>
           <a:lstStyle/>
@@ -3490,7 +3852,11 @@
           <a:bodyPr/>
           <a:lstStyle/>
           <a:p>
-            <a:endParaRPr lang="hu-HU"/>
+            <a:r>
+              <a:rPr lang="hu-HU" dirty="0" smtClean="0"/>
+              <a:t>Védekezés vírusok ellen</a:t>
+            </a:r>
+            <a:endParaRPr lang="hu-HU" dirty="0"/>
           </a:p>
         </p:txBody>
       </p:sp>
@@ -3516,7 +3882,7 @@
     </p:spTree>
     <p:extLst>
       <p:ext uri="{BB962C8B-B14F-4D97-AF65-F5344CB8AC3E}">
-        <p14:creationId xmlns:p14="http://schemas.microsoft.com/office/powerpoint/2010/main" val="2367983641"/>
+        <p14:creationId xmlns:p14="http://schemas.microsoft.com/office/powerpoint/2010/main" val="371815632"/>
       </p:ext>
     </p:extLst>
   </p:cSld>
@@ -3558,7 +3924,11 @@
           <a:bodyPr/>
           <a:lstStyle/>
           <a:p>
-            <a:endParaRPr lang="hu-HU"/>
+            <a:r>
+              <a:rPr lang="hu-HU" dirty="0" smtClean="0"/>
+              <a:t>Híres számítógépes vírusok</a:t>
+            </a:r>
+            <a:endParaRPr lang="hu-HU" dirty="0"/>
           </a:p>
         </p:txBody>
       </p:sp>
@@ -3584,7 +3954,7 @@
     </p:spTree>
     <p:extLst>
       <p:ext uri="{BB962C8B-B14F-4D97-AF65-F5344CB8AC3E}">
-        <p14:creationId xmlns:p14="http://schemas.microsoft.com/office/powerpoint/2010/main" val="371815632"/>
+        <p14:creationId xmlns:p14="http://schemas.microsoft.com/office/powerpoint/2010/main" val="2367983641"/>
       </p:ext>
     </p:extLst>
   </p:cSld>
@@ -3626,7 +3996,11 @@
           <a:bodyPr/>
           <a:lstStyle/>
           <a:p>
-            <a:endParaRPr lang="hu-HU"/>
+            <a:r>
+              <a:rPr lang="hu-HU" dirty="0" smtClean="0"/>
+              <a:t>Források</a:t>
+            </a:r>
+            <a:endParaRPr lang="hu-HU" dirty="0"/>
           </a:p>
         </p:txBody>
       </p:sp>

</xml_diff>

<commit_message>
Szöveg behúzás, menü elkészítése
</commit_message>
<xml_diff>
--- a/Beadandó SK.pptx
+++ b/Beadandó SK.pptx
@@ -252,7 +252,7 @@
           <a:p>
             <a:fld id="{BD5193CC-C62B-423D-A098-867CDE0A1E84}" type="datetimeFigureOut">
               <a:rPr lang="hu-HU" smtClean="0"/>
-              <a:t>2022.09.12.</a:t>
+              <a:t>2022.09.13.</a:t>
             </a:fld>
             <a:endParaRPr lang="hu-HU"/>
           </a:p>
@@ -422,7 +422,7 @@
           <a:p>
             <a:fld id="{BD5193CC-C62B-423D-A098-867CDE0A1E84}" type="datetimeFigureOut">
               <a:rPr lang="hu-HU" smtClean="0"/>
-              <a:t>2022.09.12.</a:t>
+              <a:t>2022.09.13.</a:t>
             </a:fld>
             <a:endParaRPr lang="hu-HU"/>
           </a:p>
@@ -602,7 +602,7 @@
           <a:p>
             <a:fld id="{BD5193CC-C62B-423D-A098-867CDE0A1E84}" type="datetimeFigureOut">
               <a:rPr lang="hu-HU" smtClean="0"/>
-              <a:t>2022.09.12.</a:t>
+              <a:t>2022.09.13.</a:t>
             </a:fld>
             <a:endParaRPr lang="hu-HU"/>
           </a:p>
@@ -772,7 +772,7 @@
           <a:p>
             <a:fld id="{BD5193CC-C62B-423D-A098-867CDE0A1E84}" type="datetimeFigureOut">
               <a:rPr lang="hu-HU" smtClean="0"/>
-              <a:t>2022.09.12.</a:t>
+              <a:t>2022.09.13.</a:t>
             </a:fld>
             <a:endParaRPr lang="hu-HU"/>
           </a:p>
@@ -1018,7 +1018,7 @@
           <a:p>
             <a:fld id="{BD5193CC-C62B-423D-A098-867CDE0A1E84}" type="datetimeFigureOut">
               <a:rPr lang="hu-HU" smtClean="0"/>
-              <a:t>2022.09.12.</a:t>
+              <a:t>2022.09.13.</a:t>
             </a:fld>
             <a:endParaRPr lang="hu-HU"/>
           </a:p>
@@ -1250,7 +1250,7 @@
           <a:p>
             <a:fld id="{BD5193CC-C62B-423D-A098-867CDE0A1E84}" type="datetimeFigureOut">
               <a:rPr lang="hu-HU" smtClean="0"/>
-              <a:t>2022.09.12.</a:t>
+              <a:t>2022.09.13.</a:t>
             </a:fld>
             <a:endParaRPr lang="hu-HU"/>
           </a:p>
@@ -1617,7 +1617,7 @@
           <a:p>
             <a:fld id="{BD5193CC-C62B-423D-A098-867CDE0A1E84}" type="datetimeFigureOut">
               <a:rPr lang="hu-HU" smtClean="0"/>
-              <a:t>2022.09.12.</a:t>
+              <a:t>2022.09.13.</a:t>
             </a:fld>
             <a:endParaRPr lang="hu-HU"/>
           </a:p>
@@ -1735,7 +1735,7 @@
           <a:p>
             <a:fld id="{BD5193CC-C62B-423D-A098-867CDE0A1E84}" type="datetimeFigureOut">
               <a:rPr lang="hu-HU" smtClean="0"/>
-              <a:t>2022.09.12.</a:t>
+              <a:t>2022.09.13.</a:t>
             </a:fld>
             <a:endParaRPr lang="hu-HU"/>
           </a:p>
@@ -1830,7 +1830,7 @@
           <a:p>
             <a:fld id="{BD5193CC-C62B-423D-A098-867CDE0A1E84}" type="datetimeFigureOut">
               <a:rPr lang="hu-HU" smtClean="0"/>
-              <a:t>2022.09.12.</a:t>
+              <a:t>2022.09.13.</a:t>
             </a:fld>
             <a:endParaRPr lang="hu-HU"/>
           </a:p>
@@ -2107,7 +2107,7 @@
           <a:p>
             <a:fld id="{BD5193CC-C62B-423D-A098-867CDE0A1E84}" type="datetimeFigureOut">
               <a:rPr lang="hu-HU" smtClean="0"/>
-              <a:t>2022.09.12.</a:t>
+              <a:t>2022.09.13.</a:t>
             </a:fld>
             <a:endParaRPr lang="hu-HU"/>
           </a:p>
@@ -2360,7 +2360,7 @@
           <a:p>
             <a:fld id="{BD5193CC-C62B-423D-A098-867CDE0A1E84}" type="datetimeFigureOut">
               <a:rPr lang="hu-HU" smtClean="0"/>
-              <a:t>2022.09.12.</a:t>
+              <a:t>2022.09.13.</a:t>
             </a:fld>
             <a:endParaRPr lang="hu-HU"/>
           </a:p>
@@ -2573,7 +2573,7 @@
           <a:p>
             <a:fld id="{BD5193CC-C62B-423D-A098-867CDE0A1E84}" type="datetimeFigureOut">
               <a:rPr lang="hu-HU" smtClean="0"/>
-              <a:t>2022.09.12.</a:t>
+              <a:t>2022.09.13.</a:t>
             </a:fld>
             <a:endParaRPr lang="hu-HU"/>
           </a:p>
@@ -3356,6 +3356,96 @@
           </a:effectLst>
         </p:spPr>
       </p:pic>
+      <p:pic>
+        <p:nvPicPr>
+          <p:cNvPr id="5" name="Kép 4"/>
+          <p:cNvPicPr>
+            <a:picLocks noChangeAspect="1"/>
+          </p:cNvPicPr>
+          <p:nvPr/>
+        </p:nvPicPr>
+        <p:blipFill>
+          <a:blip r:embed="rId3" cstate="print">
+            <a:extLst>
+              <a:ext uri="{28A0092B-C50C-407E-A947-70E740481C1C}">
+                <a14:useLocalDpi xmlns:a14="http://schemas.microsoft.com/office/drawing/2010/main" val="0"/>
+              </a:ext>
+            </a:extLst>
+          </a:blip>
+          <a:stretch>
+            <a:fillRect/>
+          </a:stretch>
+        </p:blipFill>
+        <p:spPr>
+          <a:xfrm>
+            <a:off x="1175951" y="4345204"/>
+            <a:ext cx="2374556" cy="1840742"/>
+          </a:xfrm>
+          <a:prstGeom prst="rect">
+            <a:avLst/>
+          </a:prstGeom>
+        </p:spPr>
+      </p:pic>
+      <p:pic>
+        <p:nvPicPr>
+          <p:cNvPr id="6" name="Kép 5"/>
+          <p:cNvPicPr>
+            <a:picLocks noChangeAspect="1"/>
+          </p:cNvPicPr>
+          <p:nvPr/>
+        </p:nvPicPr>
+        <p:blipFill>
+          <a:blip r:embed="rId4">
+            <a:extLst>
+              <a:ext uri="{28A0092B-C50C-407E-A947-70E740481C1C}">
+                <a14:useLocalDpi xmlns:a14="http://schemas.microsoft.com/office/drawing/2010/main" val="0"/>
+              </a:ext>
+            </a:extLst>
+          </a:blip>
+          <a:stretch>
+            <a:fillRect/>
+          </a:stretch>
+        </p:blipFill>
+        <p:spPr>
+          <a:xfrm>
+            <a:off x="1344826" y="4101646"/>
+            <a:ext cx="2205681" cy="2205681"/>
+          </a:xfrm>
+          <a:prstGeom prst="rect">
+            <a:avLst/>
+          </a:prstGeom>
+        </p:spPr>
+      </p:pic>
+      <p:pic>
+        <p:nvPicPr>
+          <p:cNvPr id="7" name="Kép 6"/>
+          <p:cNvPicPr>
+            <a:picLocks noChangeAspect="1"/>
+          </p:cNvPicPr>
+          <p:nvPr/>
+        </p:nvPicPr>
+        <p:blipFill>
+          <a:blip r:embed="rId5" cstate="print">
+            <a:extLst>
+              <a:ext uri="{28A0092B-C50C-407E-A947-70E740481C1C}">
+                <a14:useLocalDpi xmlns:a14="http://schemas.microsoft.com/office/drawing/2010/main" val="0"/>
+              </a:ext>
+            </a:extLst>
+          </a:blip>
+          <a:stretch>
+            <a:fillRect/>
+          </a:stretch>
+        </p:blipFill>
+        <p:spPr>
+          <a:xfrm>
+            <a:off x="1175951" y="4055390"/>
+            <a:ext cx="2941455" cy="2251937"/>
+          </a:xfrm>
+          <a:prstGeom prst="rect">
+            <a:avLst/>
+          </a:prstGeom>
+        </p:spPr>
+      </p:pic>
     </p:spTree>
     <p:extLst>
       <p:ext uri="{BB962C8B-B14F-4D97-AF65-F5344CB8AC3E}">
@@ -3450,6 +3540,13 @@
   <p:clrMapOvr>
     <a:masterClrMapping/>
   </p:clrMapOvr>
+  <p:timing>
+    <p:tnLst>
+      <p:par>
+        <p:cTn id="1" dur="indefinite" restart="never" nodeType="tmRoot"/>
+      </p:par>
+    </p:tnLst>
+  </p:timing>
 </p:sld>
 </file>
 
@@ -3528,7 +3625,7 @@
           <a:p>
             <a:r>
               <a:rPr lang="hu-HU" dirty="0">
-                <a:latin typeface="Arial Unicode MS" panose="020B0604020202020204" pitchFamily="34" charset="-128"/>
+                <a:latin typeface="Century Schoolbook" panose="02040604050505020304" pitchFamily="18" charset="0"/>
                 <a:ea typeface="Arial Unicode MS" panose="020B0604020202020204" pitchFamily="34" charset="-128"/>
                 <a:cs typeface="Arial Unicode MS" panose="020B0604020202020204" pitchFamily="34" charset="-128"/>
               </a:rPr>
@@ -3536,7 +3633,7 @@
             </a:r>
             <a:r>
               <a:rPr lang="hu-HU" dirty="0" smtClean="0">
-                <a:latin typeface="Arial Unicode MS" panose="020B0604020202020204" pitchFamily="34" charset="-128"/>
+                <a:latin typeface="Century Schoolbook" panose="02040604050505020304" pitchFamily="18" charset="0"/>
                 <a:ea typeface="Arial Unicode MS" panose="020B0604020202020204" pitchFamily="34" charset="-128"/>
                 <a:cs typeface="Arial Unicode MS" panose="020B0604020202020204" pitchFamily="34" charset="-128"/>
               </a:rPr>
@@ -3544,7 +3641,7 @@
             </a:r>
             <a:r>
               <a:rPr lang="hu-HU" dirty="0">
-                <a:latin typeface="Arial Unicode MS" panose="020B0604020202020204" pitchFamily="34" charset="-128"/>
+                <a:latin typeface="Century Schoolbook" panose="02040604050505020304" pitchFamily="18" charset="0"/>
                 <a:ea typeface="Arial Unicode MS" panose="020B0604020202020204" pitchFamily="34" charset="-128"/>
                 <a:cs typeface="Arial Unicode MS" panose="020B0604020202020204" pitchFamily="34" charset="-128"/>
               </a:rPr>
@@ -3552,7 +3649,7 @@
             </a:r>
             <a:r>
               <a:rPr lang="hu-HU" dirty="0" smtClean="0">
-                <a:latin typeface="Arial Unicode MS" panose="020B0604020202020204" pitchFamily="34" charset="-128"/>
+                <a:latin typeface="Century Schoolbook" panose="02040604050505020304" pitchFamily="18" charset="0"/>
                 <a:ea typeface="Arial Unicode MS" panose="020B0604020202020204" pitchFamily="34" charset="-128"/>
                 <a:cs typeface="Arial Unicode MS" panose="020B0604020202020204" pitchFamily="34" charset="-128"/>
               </a:rPr>
@@ -3569,7 +3666,7 @@
             </a:pPr>
             <a:r>
               <a:rPr lang="hu-HU" sz="2800" dirty="0">
-                <a:latin typeface="Arial Unicode MS" panose="020B0604020202020204" pitchFamily="34" charset="-128"/>
+                <a:latin typeface="Century Schoolbook" panose="02040604050505020304" pitchFamily="18" charset="0"/>
                 <a:ea typeface="Arial Unicode MS" panose="020B0604020202020204" pitchFamily="34" charset="-128"/>
                 <a:cs typeface="Arial Unicode MS" panose="020B0604020202020204" pitchFamily="34" charset="-128"/>
               </a:rPr>
@@ -3577,7 +3674,7 @@
             </a:r>
             <a:r>
               <a:rPr lang="hu-HU" sz="2800" dirty="0" smtClean="0">
-                <a:latin typeface="Arial Unicode MS" panose="020B0604020202020204" pitchFamily="34" charset="-128"/>
+                <a:latin typeface="Century Schoolbook" panose="02040604050505020304" pitchFamily="18" charset="0"/>
                 <a:ea typeface="Arial Unicode MS" panose="020B0604020202020204" pitchFamily="34" charset="-128"/>
                 <a:cs typeface="Arial Unicode MS" panose="020B0604020202020204" pitchFamily="34" charset="-128"/>
               </a:rPr>
@@ -3594,7 +3691,7 @@
             </a:pPr>
             <a:r>
               <a:rPr lang="hu-HU" sz="2800" dirty="0">
-                <a:latin typeface="Arial Unicode MS" panose="020B0604020202020204" pitchFamily="34" charset="-128"/>
+                <a:latin typeface="Century Schoolbook" panose="02040604050505020304" pitchFamily="18" charset="0"/>
                 <a:ea typeface="Arial Unicode MS" panose="020B0604020202020204" pitchFamily="34" charset="-128"/>
                 <a:cs typeface="Arial Unicode MS" panose="020B0604020202020204" pitchFamily="34" charset="-128"/>
               </a:rPr>
@@ -3602,7 +3699,7 @@
             </a:r>
             <a:r>
               <a:rPr lang="hu-HU" sz="2800" dirty="0" smtClean="0">
-                <a:latin typeface="Arial Unicode MS" panose="020B0604020202020204" pitchFamily="34" charset="-128"/>
+                <a:latin typeface="Century Schoolbook" panose="02040604050505020304" pitchFamily="18" charset="0"/>
                 <a:ea typeface="Arial Unicode MS" panose="020B0604020202020204" pitchFamily="34" charset="-128"/>
                 <a:cs typeface="Arial Unicode MS" panose="020B0604020202020204" pitchFamily="34" charset="-128"/>
               </a:rPr>
@@ -3619,7 +3716,7 @@
             </a:pPr>
             <a:r>
               <a:rPr lang="hu-HU" sz="2800" dirty="0">
-                <a:latin typeface="Arial Unicode MS" panose="020B0604020202020204" pitchFamily="34" charset="-128"/>
+                <a:latin typeface="Century Schoolbook" panose="02040604050505020304" pitchFamily="18" charset="0"/>
                 <a:ea typeface="Arial Unicode MS" panose="020B0604020202020204" pitchFamily="34" charset="-128"/>
                 <a:cs typeface="Arial Unicode MS" panose="020B0604020202020204" pitchFamily="34" charset="-128"/>
               </a:rPr>
@@ -3627,7 +3724,7 @@
             </a:r>
             <a:r>
               <a:rPr lang="hu-HU" sz="2800" dirty="0" smtClean="0">
-                <a:latin typeface="Arial Unicode MS" panose="020B0604020202020204" pitchFamily="34" charset="-128"/>
+                <a:latin typeface="Century Schoolbook" panose="02040604050505020304" pitchFamily="18" charset="0"/>
                 <a:ea typeface="Arial Unicode MS" panose="020B0604020202020204" pitchFamily="34" charset="-128"/>
                 <a:cs typeface="Arial Unicode MS" panose="020B0604020202020204" pitchFamily="34" charset="-128"/>
               </a:rPr>
@@ -3635,7 +3732,9 @@
             </a:r>
           </a:p>
           <a:p>
-            <a:endParaRPr lang="hu-HU" dirty="0"/>
+            <a:endParaRPr lang="hu-HU" dirty="0">
+              <a:latin typeface="Century Schoolbook" panose="02040604050505020304" pitchFamily="18" charset="0"/>
+            </a:endParaRPr>
           </a:p>
         </p:txBody>
       </p:sp>
@@ -3649,6 +3748,13 @@
   <p:clrMapOvr>
     <a:masterClrMapping/>
   </p:clrMapOvr>
+  <p:timing>
+    <p:tnLst>
+      <p:par>
+        <p:cTn id="1" dur="indefinite" restart="never" nodeType="tmRoot"/>
+      </p:par>
+    </p:tnLst>
+  </p:timing>
 </p:sld>
 </file>
 
@@ -3681,45 +3787,296 @@
         </p:nvSpPr>
         <p:spPr>
           <a:xfrm>
-            <a:off x="838200" y="947737"/>
-            <a:ext cx="4445000" cy="877888"/>
+            <a:off x="405714" y="239504"/>
+            <a:ext cx="5537886" cy="877888"/>
           </a:xfrm>
         </p:spPr>
         <p:txBody>
           <a:bodyPr>
-            <a:normAutofit fontScale="90000"/>
+            <a:normAutofit/>
           </a:bodyPr>
           <a:lstStyle/>
           <a:p>
             <a:r>
-              <a:rPr lang="hu-HU" dirty="0" smtClean="0"/>
-              <a:t>Legismertebb fajtái</a:t>
-            </a:r>
-            <a:endParaRPr lang="hu-HU" dirty="0"/>
-          </a:p>
-        </p:txBody>
-      </p:sp>
-      <p:sp>
-        <p:nvSpPr>
-          <p:cNvPr id="3" name="Tartalom helye 2"/>
-          <p:cNvSpPr>
-            <a:spLocks noGrp="1"/>
-          </p:cNvSpPr>
-          <p:nvPr>
-            <p:ph idx="1"/>
-          </p:nvPr>
+              <a:rPr lang="hu-HU" sz="4000" b="1" dirty="0" smtClean="0">
+                <a:latin typeface="Century Schoolbook" panose="02040604050505020304" pitchFamily="18" charset="0"/>
+              </a:rPr>
+              <a:t>Legismertebb</a:t>
+            </a:r>
+            <a:r>
+              <a:rPr lang="hu-HU" b="1" dirty="0" smtClean="0">
+                <a:latin typeface="Century Schoolbook" panose="02040604050505020304" pitchFamily="18" charset="0"/>
+              </a:rPr>
+              <a:t> fajtái</a:t>
+            </a:r>
+            <a:endParaRPr lang="hu-HU" b="1" dirty="0">
+              <a:latin typeface="Century Schoolbook" panose="02040604050505020304" pitchFamily="18" charset="0"/>
+            </a:endParaRPr>
+          </a:p>
+        </p:txBody>
+      </p:sp>
+      <p:sp>
+        <p:nvSpPr>
+          <p:cNvPr id="4" name="Szövegdoboz 3"/>
+          <p:cNvSpPr txBox="1"/>
+          <p:nvPr/>
         </p:nvSpPr>
         <p:spPr>
           <a:xfrm>
-            <a:off x="838200" y="2028825"/>
-            <a:ext cx="10515600" cy="4351338"/>
+            <a:off x="209034" y="1139534"/>
+            <a:ext cx="7390372" cy="1446550"/>
           </a:xfrm>
+          <a:prstGeom prst="rect">
+            <a:avLst/>
+          </a:prstGeom>
+          <a:noFill/>
         </p:spPr>
         <p:txBody>
-          <a:bodyPr/>
-          <a:lstStyle/>
-          <a:p>
-            <a:endParaRPr lang="hu-HU" dirty="0"/>
+          <a:bodyPr wrap="square" rtlCol="0">
+            <a:spAutoFit/>
+          </a:bodyPr>
+          <a:lstStyle/>
+          <a:p>
+            <a:pPr algn="just"/>
+            <a:r>
+              <a:rPr lang="hu-HU" sz="2200" b="1" dirty="0">
+                <a:latin typeface="Century Schoolbook" panose="02040604050505020304" pitchFamily="18" charset="0"/>
+              </a:rPr>
+              <a:t>Fájlvírusok:</a:t>
+            </a:r>
+          </a:p>
+          <a:p>
+            <a:pPr lvl="1" algn="just"/>
+            <a:r>
+              <a:rPr lang="hu-HU" sz="2200" dirty="0">
+                <a:latin typeface="Century Schoolbook" panose="02040604050505020304" pitchFamily="18" charset="0"/>
+              </a:rPr>
+              <a:t>-Végrehajtható állományokat fertőznek meg(exe, sys, stb.)</a:t>
+            </a:r>
+          </a:p>
+          <a:p>
+            <a:pPr lvl="1" algn="just"/>
+            <a:r>
+              <a:rPr lang="hu-HU" sz="2200" dirty="0">
+                <a:latin typeface="Century Schoolbook" panose="02040604050505020304" pitchFamily="18" charset="0"/>
+              </a:rPr>
+              <a:t>-Elindítás után aktiválódik</a:t>
+            </a:r>
+          </a:p>
+        </p:txBody>
+      </p:sp>
+      <p:sp>
+        <p:nvSpPr>
+          <p:cNvPr id="5" name="Szövegdoboz 4"/>
+          <p:cNvSpPr txBox="1"/>
+          <p:nvPr/>
+        </p:nvSpPr>
+        <p:spPr>
+          <a:xfrm>
+            <a:off x="209035" y="2910830"/>
+            <a:ext cx="7390372" cy="1785104"/>
+          </a:xfrm>
+          <a:prstGeom prst="rect">
+            <a:avLst/>
+          </a:prstGeom>
+          <a:noFill/>
+        </p:spPr>
+        <p:txBody>
+          <a:bodyPr wrap="square" rtlCol="0">
+            <a:spAutoFit/>
+          </a:bodyPr>
+          <a:lstStyle/>
+          <a:p>
+            <a:pPr algn="just"/>
+            <a:r>
+              <a:rPr lang="hu-HU" sz="2200" b="1" dirty="0" smtClean="0">
+                <a:latin typeface="Century Schoolbook" panose="02040604050505020304" pitchFamily="18" charset="0"/>
+              </a:rPr>
+              <a:t>Bootvírusok:</a:t>
+            </a:r>
+          </a:p>
+          <a:p>
+            <a:pPr lvl="1" algn="just"/>
+            <a:r>
+              <a:rPr lang="hu-HU" sz="2200" dirty="0" smtClean="0">
+                <a:latin typeface="Century Schoolbook" panose="02040604050505020304" pitchFamily="18" charset="0"/>
+              </a:rPr>
+              <a:t>-Floppy/merevlemez boot-területeinek egyikébe írják be magukat</a:t>
+            </a:r>
+          </a:p>
+          <a:p>
+            <a:pPr lvl="1" algn="just"/>
+            <a:r>
+              <a:rPr lang="hu-HU" sz="2200" dirty="0" smtClean="0">
+                <a:latin typeface="Century Schoolbook" panose="02040604050505020304" pitchFamily="18" charset="0"/>
+              </a:rPr>
+              <a:t>-Akkor fertőződnek, hogyha fertőzött lemezről indul a gép</a:t>
+            </a:r>
+          </a:p>
+        </p:txBody>
+      </p:sp>
+      <p:sp>
+        <p:nvSpPr>
+          <p:cNvPr id="6" name="Szövegdoboz 5"/>
+          <p:cNvSpPr txBox="1"/>
+          <p:nvPr/>
+        </p:nvSpPr>
+        <p:spPr>
+          <a:xfrm>
+            <a:off x="209034" y="5020680"/>
+            <a:ext cx="7216346" cy="1107996"/>
+          </a:xfrm>
+          <a:prstGeom prst="rect">
+            <a:avLst/>
+          </a:prstGeom>
+          <a:noFill/>
+        </p:spPr>
+        <p:txBody>
+          <a:bodyPr wrap="square" rtlCol="0">
+            <a:spAutoFit/>
+          </a:bodyPr>
+          <a:lstStyle/>
+          <a:p>
+            <a:pPr algn="just"/>
+            <a:r>
+              <a:rPr lang="hu-HU" sz="2200" b="1" dirty="0" smtClean="0">
+                <a:latin typeface="Century Schoolbook" panose="02040604050505020304" pitchFamily="18" charset="0"/>
+              </a:rPr>
+              <a:t>Makrovírusok:</a:t>
+            </a:r>
+          </a:p>
+          <a:p>
+            <a:pPr lvl="1" algn="just"/>
+            <a:r>
+              <a:rPr lang="hu-HU" sz="2200" dirty="0" smtClean="0">
+                <a:latin typeface="Century Schoolbook" panose="02040604050505020304" pitchFamily="18" charset="0"/>
+              </a:rPr>
+              <a:t>-Dokumentumok útján terjednek</a:t>
+            </a:r>
+          </a:p>
+          <a:p>
+            <a:pPr lvl="1" algn="just"/>
+            <a:r>
+              <a:rPr lang="hu-HU" sz="2200" dirty="0" smtClean="0">
+                <a:latin typeface="Century Schoolbook" panose="02040604050505020304" pitchFamily="18" charset="0"/>
+              </a:rPr>
+              <a:t>-Egy vagy több dokumentumba is beágyazódik</a:t>
+            </a:r>
+          </a:p>
+        </p:txBody>
+      </p:sp>
+      <p:pic>
+        <p:nvPicPr>
+          <p:cNvPr id="7" name="Kép 6"/>
+          <p:cNvPicPr>
+            <a:picLocks noChangeAspect="1"/>
+          </p:cNvPicPr>
+          <p:nvPr/>
+        </p:nvPicPr>
+        <p:blipFill>
+          <a:blip r:embed="rId2" cstate="print">
+            <a:extLst>
+              <a:ext uri="{28A0092B-C50C-407E-A947-70E740481C1C}">
+                <a14:useLocalDpi xmlns:a14="http://schemas.microsoft.com/office/drawing/2010/main" val="0"/>
+              </a:ext>
+            </a:extLst>
+          </a:blip>
+          <a:stretch>
+            <a:fillRect/>
+          </a:stretch>
+        </p:blipFill>
+        <p:spPr>
+          <a:xfrm>
+            <a:off x="7685903" y="2457622"/>
+            <a:ext cx="3979222" cy="2238312"/>
+          </a:xfrm>
+          <a:prstGeom prst="roundRect">
+            <a:avLst>
+              <a:gd name="adj" fmla="val 8594"/>
+            </a:avLst>
+          </a:prstGeom>
+          <a:solidFill>
+            <a:srgbClr val="FFFFFF">
+              <a:shade val="85000"/>
+            </a:srgbClr>
+          </a:solidFill>
+          <a:ln>
+            <a:noFill/>
+          </a:ln>
+          <a:effectLst>
+            <a:reflection blurRad="12700" stA="38000" endPos="28000" dist="5000" dir="5400000" sy="-100000" algn="bl" rotWithShape="0"/>
+          </a:effectLst>
+        </p:spPr>
+      </p:pic>
+      <p:pic>
+        <p:nvPicPr>
+          <p:cNvPr id="8" name="Kép 7"/>
+          <p:cNvPicPr>
+            <a:picLocks noChangeAspect="1"/>
+          </p:cNvPicPr>
+          <p:nvPr/>
+        </p:nvPicPr>
+        <p:blipFill>
+          <a:blip r:embed="rId3">
+            <a:extLst>
+              <a:ext uri="{28A0092B-C50C-407E-A947-70E740481C1C}">
+                <a14:useLocalDpi xmlns:a14="http://schemas.microsoft.com/office/drawing/2010/main" val="0"/>
+              </a:ext>
+            </a:extLst>
+          </a:blip>
+          <a:stretch>
+            <a:fillRect/>
+          </a:stretch>
+        </p:blipFill>
+        <p:spPr>
+          <a:xfrm>
+            <a:off x="6818871" y="4695934"/>
+            <a:ext cx="3713782" cy="2063212"/>
+          </a:xfrm>
+          <a:prstGeom prst="roundRect">
+            <a:avLst>
+              <a:gd name="adj" fmla="val 8594"/>
+            </a:avLst>
+          </a:prstGeom>
+          <a:solidFill>
+            <a:srgbClr val="FFFFFF">
+              <a:shade val="85000"/>
+            </a:srgbClr>
+          </a:solidFill>
+          <a:ln>
+            <a:noFill/>
+          </a:ln>
+          <a:effectLst>
+            <a:reflection blurRad="12700" stA="38000" endPos="28000" dist="5000" dir="5400000" sy="-100000" algn="bl" rotWithShape="0"/>
+          </a:effectLst>
+        </p:spPr>
+      </p:pic>
+      <p:sp>
+        <p:nvSpPr>
+          <p:cNvPr id="9" name="Szövegdoboz 8"/>
+          <p:cNvSpPr txBox="1"/>
+          <p:nvPr/>
+        </p:nvSpPr>
+        <p:spPr>
+          <a:xfrm>
+            <a:off x="9934833" y="1117392"/>
+            <a:ext cx="864972" cy="523220"/>
+          </a:xfrm>
+          <a:prstGeom prst="rect">
+            <a:avLst/>
+          </a:prstGeom>
+          <a:noFill/>
+        </p:spPr>
+        <p:txBody>
+          <a:bodyPr wrap="square" rtlCol="0">
+            <a:spAutoFit/>
+          </a:bodyPr>
+          <a:lstStyle/>
+          <a:p>
+            <a:r>
+              <a:rPr lang="hu-HU" sz="2800" dirty="0" smtClean="0"/>
+              <a:t>KÉP!</a:t>
+            </a:r>
           </a:p>
         </p:txBody>
       </p:sp>
@@ -3733,6 +4090,13 @@
   <p:clrMapOvr>
     <a:masterClrMapping/>
   </p:clrMapOvr>
+  <p:timing>
+    <p:tnLst>
+      <p:par>
+        <p:cTn id="1" dur="indefinite" restart="never" nodeType="tmRoot"/>
+      </p:par>
+    </p:tnLst>
+  </p:timing>
 </p:sld>
 </file>
 
@@ -3817,6 +4181,13 @@
   <p:clrMapOvr>
     <a:masterClrMapping/>
   </p:clrMapOvr>
+  <p:timing>
+    <p:tnLst>
+      <p:par>
+        <p:cTn id="1" dur="indefinite" restart="never" nodeType="tmRoot"/>
+      </p:par>
+    </p:tnLst>
+  </p:timing>
 </p:sld>
 </file>
 
@@ -3847,6 +4218,40 @@
             <p:ph type="title"/>
           </p:nvPr>
         </p:nvSpPr>
+        <p:spPr>
+          <a:xfrm>
+            <a:off x="838200" y="130346"/>
+            <a:ext cx="10515600" cy="1325563"/>
+          </a:xfrm>
+        </p:spPr>
+        <p:txBody>
+          <a:bodyPr>
+            <a:normAutofit/>
+          </a:bodyPr>
+          <a:lstStyle/>
+          <a:p>
+            <a:r>
+              <a:rPr lang="hu-HU" sz="4000" dirty="0" smtClean="0">
+                <a:latin typeface="Century Schoolbook" panose="02040604050505020304" pitchFamily="18" charset="0"/>
+              </a:rPr>
+              <a:t>Védekezés vírusok ellen</a:t>
+            </a:r>
+            <a:endParaRPr lang="hu-HU" sz="4000" dirty="0">
+              <a:latin typeface="Century Schoolbook" panose="02040604050505020304" pitchFamily="18" charset="0"/>
+            </a:endParaRPr>
+          </a:p>
+        </p:txBody>
+      </p:sp>
+      <p:sp>
+        <p:nvSpPr>
+          <p:cNvPr id="3" name="Tartalom helye 2"/>
+          <p:cNvSpPr>
+            <a:spLocks noGrp="1"/>
+          </p:cNvSpPr>
+          <p:nvPr>
+            <p:ph idx="1"/>
+          </p:nvPr>
+        </p:nvSpPr>
         <p:spPr/>
         <p:txBody>
           <a:bodyPr/>
@@ -3854,28 +4259,30 @@
           <a:p>
             <a:r>
               <a:rPr lang="hu-HU" dirty="0" smtClean="0"/>
-              <a:t>Védekezés vírusok ellen</a:t>
-            </a:r>
+              <a:t>Kerüljük a gyanús oldalakat, emaileket</a:t>
+            </a:r>
+          </a:p>
+          <a:p>
+            <a:r>
+              <a:rPr lang="hu-HU" dirty="0" smtClean="0"/>
+              <a:t>Használjunk vírusírtót</a:t>
+            </a:r>
+          </a:p>
+          <a:p>
+            <a:r>
+              <a:rPr lang="hu-HU" dirty="0" smtClean="0"/>
+              <a:t>Ne nyissunk meg spam leveleket, illetve a </a:t>
+            </a:r>
+            <a:r>
+              <a:rPr lang="hu-HU" smtClean="0"/>
+              <a:t>benne található üzeneteket se</a:t>
+            </a:r>
+          </a:p>
+          <a:p>
+            <a:endParaRPr lang="hu-HU" dirty="0" smtClean="0"/>
+          </a:p>
+          <a:p>
             <a:endParaRPr lang="hu-HU" dirty="0"/>
-          </a:p>
-        </p:txBody>
-      </p:sp>
-      <p:sp>
-        <p:nvSpPr>
-          <p:cNvPr id="3" name="Tartalom helye 2"/>
-          <p:cNvSpPr>
-            <a:spLocks noGrp="1"/>
-          </p:cNvSpPr>
-          <p:nvPr>
-            <p:ph idx="1"/>
-          </p:nvPr>
-        </p:nvSpPr>
-        <p:spPr/>
-        <p:txBody>
-          <a:bodyPr/>
-          <a:lstStyle/>
-          <a:p>
-            <a:endParaRPr lang="hu-HU"/>
           </a:p>
         </p:txBody>
       </p:sp>
@@ -4019,7 +4426,37 @@
           <a:bodyPr/>
           <a:lstStyle/>
           <a:p>
-            <a:endParaRPr lang="hu-HU"/>
+            <a:r>
+              <a:rPr lang="hu-HU" dirty="0">
+                <a:hlinkClick r:id="rId2"/>
+              </a:rPr>
+              <a:t>https://</a:t>
+            </a:r>
+            <a:r>
+              <a:rPr lang="hu-HU" dirty="0" smtClean="0">
+                <a:hlinkClick r:id="rId2"/>
+              </a:rPr>
+              <a:t>hu.theastrologypage.com/macro-virus#menu-1</a:t>
+            </a:r>
+            <a:endParaRPr lang="hu-HU" dirty="0" smtClean="0"/>
+          </a:p>
+          <a:p>
+            <a:r>
+              <a:rPr lang="hu-HU" dirty="0">
+                <a:hlinkClick r:id="rId3"/>
+              </a:rPr>
+              <a:t>https://</a:t>
+            </a:r>
+            <a:r>
+              <a:rPr lang="hu-HU" dirty="0" smtClean="0">
+                <a:hlinkClick r:id="rId3"/>
+              </a:rPr>
+              <a:t>hu.wikipedia.org/wiki/Sz%C3%A1m%C3%ADt%C3%B3g%C3%A9pes_v%C3%ADrus</a:t>
+            </a:r>
+            <a:endParaRPr lang="hu-HU" dirty="0" smtClean="0"/>
+          </a:p>
+          <a:p>
+            <a:endParaRPr lang="hu-HU" dirty="0"/>
           </a:p>
         </p:txBody>
       </p:sp>

</xml_diff>